<commit_message>
docs(Slide): Submissão do Documento
</commit_message>
<xml_diff>
--- a/ApresentaçãoPI.pptx
+++ b/ApresentaçãoPI.pptx
@@ -1752,7 +1752,7 @@
           <a:p>
             <a:fld id="{1D8BD707-D9CF-40AE-B4C6-C98DA3205C09}" type="datetimeFigureOut">
               <a:rPr lang="en-US"/>
-              <a:t>11/23/2025</a:t>
+              <a:t>11/24/2025</a:t>
             </a:fld>
             <a:endParaRPr lang="en-US" dirty="0"/>
           </a:p>
@@ -2188,13 +2188,22 @@
               <a:defRPr/>
             </a:pPr>
             <a:r>
+              <a:rPr lang="pt-BR" sz="2400" kern="0">
+                <a:solidFill>
+                  <a:prstClr val="white"/>
+                </a:solidFill>
+                <a:latin typeface="Calibri" panose="020F0502020204030204"/>
+              </a:rPr>
+              <a:t>Guilherme Gois </a:t>
+            </a:r>
+            <a:r>
               <a:rPr lang="pt-BR" sz="2400" kern="0" dirty="0">
                 <a:solidFill>
                   <a:prstClr val="white"/>
                 </a:solidFill>
                 <a:latin typeface="Calibri" panose="020F0502020204030204"/>
               </a:rPr>
-              <a:t>Guilherme Goes Cruz Coelho RA: 25.00702-2</a:t>
+              <a:t>Cruz Coelho RA: 25.00702-2</a:t>
             </a:r>
           </a:p>
           <a:p>
@@ -4430,7 +4439,7 @@
         </p:nvSpPr>
         <p:spPr>
           <a:xfrm>
-            <a:off x="5163741" y="2393394"/>
+            <a:off x="5163800" y="2405854"/>
             <a:ext cx="4302800" cy="5308163"/>
           </a:xfrm>
           <a:prstGeom prst="roundRect">
@@ -4604,8 +4613,8 @@
         </p:nvSpPr>
         <p:spPr>
           <a:xfrm>
-            <a:off x="5377934" y="3285530"/>
-            <a:ext cx="3874413" cy="4180870"/>
+            <a:off x="5377934" y="3584496"/>
+            <a:ext cx="3874413" cy="3881903"/>
           </a:xfrm>
           <a:prstGeom prst="rect">
             <a:avLst/>
@@ -4873,7 +4882,7 @@
         <p:spPr>
           <a:xfrm>
             <a:off x="9872067" y="3584496"/>
-            <a:ext cx="3874294" cy="1530548"/>
+            <a:ext cx="3874294" cy="1530547"/>
           </a:xfrm>
           <a:prstGeom prst="rect">
             <a:avLst/>

</xml_diff>